<commit_message>
Agregado diccionario de datos
</commit_message>
<xml_diff>
--- a/presentación segunda iteración.pptx
+++ b/presentación segunda iteración.pptx
@@ -5,7 +5,7 @@
     <p:sldMasterId id="2147483810" r:id="rId1"/>
   </p:sldMasterIdLst>
   <p:notesMasterIdLst>
-    <p:notesMasterId r:id="rId23"/>
+    <p:notesMasterId r:id="rId24"/>
   </p:notesMasterIdLst>
   <p:sldIdLst>
     <p:sldId id="256" r:id="rId2"/>
@@ -25,10 +25,11 @@
     <p:sldId id="259" r:id="rId16"/>
     <p:sldId id="273" r:id="rId17"/>
     <p:sldId id="274" r:id="rId18"/>
-    <p:sldId id="261" r:id="rId19"/>
-    <p:sldId id="293" r:id="rId20"/>
-    <p:sldId id="291" r:id="rId21"/>
-    <p:sldId id="277" r:id="rId22"/>
+    <p:sldId id="294" r:id="rId19"/>
+    <p:sldId id="261" r:id="rId20"/>
+    <p:sldId id="293" r:id="rId21"/>
+    <p:sldId id="291" r:id="rId22"/>
+    <p:sldId id="277" r:id="rId23"/>
   </p:sldIdLst>
   <p:sldSz cx="12192000" cy="6858000"/>
   <p:notesSz cx="6858000" cy="9144000"/>
@@ -1189,429 +1190,6 @@
       <dsp:cNvGrpSpPr/>
     </dsp:nvGrpSpPr>
     <dsp:grpSpPr/>
-    <dsp:sp modelId="{C76C1348-8C62-49B3-ABA8-46DE86A2A3CA}">
-      <dsp:nvSpPr>
-        <dsp:cNvPr id="0" name=""/>
-        <dsp:cNvSpPr/>
-      </dsp:nvSpPr>
-      <dsp:spPr>
-        <a:xfrm>
-          <a:off x="2534384" y="421329"/>
-          <a:ext cx="2130147" cy="2130147"/>
-        </a:xfrm>
-        <a:prstGeom prst="ellipse">
-          <a:avLst/>
-        </a:prstGeom>
-        <a:solidFill>
-          <a:srgbClr val="FF0000"/>
-        </a:solidFill>
-        <a:ln w="13970" cap="flat" cmpd="sng" algn="ctr">
-          <a:solidFill>
-            <a:schemeClr val="lt1">
-              <a:hueOff val="0"/>
-              <a:satOff val="0"/>
-              <a:lumOff val="0"/>
-              <a:alphaOff val="0"/>
-            </a:schemeClr>
-          </a:solidFill>
-          <a:prstDash val="solid"/>
-        </a:ln>
-        <a:effectLst/>
-      </dsp:spPr>
-      <dsp:style>
-        <a:lnRef idx="2">
-          <a:scrgbClr r="0" g="0" b="0"/>
-        </a:lnRef>
-        <a:fillRef idx="1">
-          <a:scrgbClr r="0" g="0" b="0"/>
-        </a:fillRef>
-        <a:effectRef idx="0">
-          <a:scrgbClr r="0" g="0" b="0"/>
-        </a:effectRef>
-        <a:fontRef idx="minor">
-          <a:schemeClr val="lt1"/>
-        </a:fontRef>
-      </dsp:style>
-      <dsp:txBody>
-        <a:bodyPr spcFirstLastPara="0" vert="horz" wrap="square" lIns="25400" tIns="25400" rIns="25400" bIns="25400" numCol="1" spcCol="1270" anchor="ctr" anchorCtr="0">
-          <a:noAutofit/>
-        </a:bodyPr>
-        <a:lstStyle/>
-        <a:p>
-          <a:pPr lvl="0" algn="ctr" defTabSz="889000">
-            <a:lnSpc>
-              <a:spcPct val="90000"/>
-            </a:lnSpc>
-            <a:spcBef>
-              <a:spcPct val="0"/>
-            </a:spcBef>
-            <a:spcAft>
-              <a:spcPct val="35000"/>
-            </a:spcAft>
-          </a:pPr>
-          <a:r>
-            <a:rPr lang="es-CL" sz="2000" kern="1200" dirty="0" smtClean="0"/>
-            <a:t>Test falla</a:t>
-          </a:r>
-          <a:endParaRPr lang="es-CL" sz="2000" kern="1200" dirty="0"/>
-        </a:p>
-      </dsp:txBody>
-      <dsp:txXfrm>
-        <a:off x="2846337" y="733282"/>
-        <a:ext cx="1506241" cy="1506241"/>
-      </dsp:txXfrm>
-    </dsp:sp>
-    <dsp:sp modelId="{C2AAD9A6-BC90-4D96-8982-800C7083F0C6}">
-      <dsp:nvSpPr>
-        <dsp:cNvPr id="0" name=""/>
-        <dsp:cNvSpPr/>
-      </dsp:nvSpPr>
-      <dsp:spPr>
-        <a:xfrm rot="3002127">
-          <a:off x="4327117" y="2291216"/>
-          <a:ext cx="496114" cy="718924"/>
-        </a:xfrm>
-        <a:prstGeom prst="rightArrow">
-          <a:avLst>
-            <a:gd name="adj1" fmla="val 60000"/>
-            <a:gd name="adj2" fmla="val 50000"/>
-          </a:avLst>
-        </a:prstGeom>
-        <a:solidFill>
-          <a:schemeClr val="accent1">
-            <a:tint val="60000"/>
-            <a:hueOff val="0"/>
-            <a:satOff val="0"/>
-            <a:lumOff val="0"/>
-            <a:alphaOff val="0"/>
-          </a:schemeClr>
-        </a:solidFill>
-        <a:ln>
-          <a:noFill/>
-        </a:ln>
-        <a:effectLst/>
-      </dsp:spPr>
-      <dsp:style>
-        <a:lnRef idx="0">
-          <a:scrgbClr r="0" g="0" b="0"/>
-        </a:lnRef>
-        <a:fillRef idx="1">
-          <a:scrgbClr r="0" g="0" b="0"/>
-        </a:fillRef>
-        <a:effectRef idx="0">
-          <a:scrgbClr r="0" g="0" b="0"/>
-        </a:effectRef>
-        <a:fontRef idx="minor">
-          <a:schemeClr val="lt1"/>
-        </a:fontRef>
-      </dsp:style>
-      <dsp:txBody>
-        <a:bodyPr spcFirstLastPara="0" vert="horz" wrap="square" lIns="0" tIns="0" rIns="0" bIns="0" numCol="1" spcCol="1270" anchor="ctr" anchorCtr="0">
-          <a:noAutofit/>
-        </a:bodyPr>
-        <a:lstStyle/>
-        <a:p>
-          <a:pPr lvl="0" algn="ctr" defTabSz="1377950">
-            <a:lnSpc>
-              <a:spcPct val="90000"/>
-            </a:lnSpc>
-            <a:spcBef>
-              <a:spcPct val="0"/>
-            </a:spcBef>
-            <a:spcAft>
-              <a:spcPct val="35000"/>
-            </a:spcAft>
-          </a:pPr>
-          <a:endParaRPr lang="es-CL" sz="3100" kern="1200"/>
-        </a:p>
-      </dsp:txBody>
-      <dsp:txXfrm>
-        <a:off x="4353735" y="2377965"/>
-        <a:ext cx="347280" cy="431354"/>
-      </dsp:txXfrm>
-    </dsp:sp>
-    <dsp:sp modelId="{06F5E886-E7D3-456B-8D24-E4CA36151A7B}">
-      <dsp:nvSpPr>
-        <dsp:cNvPr id="0" name=""/>
-        <dsp:cNvSpPr/>
-      </dsp:nvSpPr>
-      <dsp:spPr>
-        <a:xfrm>
-          <a:off x="4503854" y="2771404"/>
-          <a:ext cx="2130147" cy="2130147"/>
-        </a:xfrm>
-        <a:prstGeom prst="ellipse">
-          <a:avLst/>
-        </a:prstGeom>
-        <a:solidFill>
-          <a:srgbClr val="00B050"/>
-        </a:solidFill>
-        <a:ln w="13970" cap="flat" cmpd="sng" algn="ctr">
-          <a:solidFill>
-            <a:schemeClr val="lt1">
-              <a:hueOff val="0"/>
-              <a:satOff val="0"/>
-              <a:lumOff val="0"/>
-              <a:alphaOff val="0"/>
-            </a:schemeClr>
-          </a:solidFill>
-          <a:prstDash val="solid"/>
-        </a:ln>
-        <a:effectLst/>
-      </dsp:spPr>
-      <dsp:style>
-        <a:lnRef idx="2">
-          <a:scrgbClr r="0" g="0" b="0"/>
-        </a:lnRef>
-        <a:fillRef idx="1">
-          <a:scrgbClr r="0" g="0" b="0"/>
-        </a:fillRef>
-        <a:effectRef idx="0">
-          <a:scrgbClr r="0" g="0" b="0"/>
-        </a:effectRef>
-        <a:fontRef idx="minor">
-          <a:schemeClr val="lt1"/>
-        </a:fontRef>
-      </dsp:style>
-      <dsp:txBody>
-        <a:bodyPr spcFirstLastPara="0" vert="horz" wrap="square" lIns="25400" tIns="25400" rIns="25400" bIns="25400" numCol="1" spcCol="1270" anchor="ctr" anchorCtr="0">
-          <a:noAutofit/>
-        </a:bodyPr>
-        <a:lstStyle/>
-        <a:p>
-          <a:pPr lvl="0" algn="ctr" defTabSz="889000">
-            <a:lnSpc>
-              <a:spcPct val="90000"/>
-            </a:lnSpc>
-            <a:spcBef>
-              <a:spcPct val="0"/>
-            </a:spcBef>
-            <a:spcAft>
-              <a:spcPct val="35000"/>
-            </a:spcAft>
-          </a:pPr>
-          <a:r>
-            <a:rPr lang="es-CL" sz="2000" kern="1200" dirty="0" smtClean="0"/>
-            <a:t>Test funciona</a:t>
-          </a:r>
-          <a:endParaRPr lang="es-CL" sz="2000" kern="1200" dirty="0"/>
-        </a:p>
-      </dsp:txBody>
-      <dsp:txXfrm>
-        <a:off x="4815807" y="3083357"/>
-        <a:ext cx="1506241" cy="1506241"/>
-      </dsp:txXfrm>
-    </dsp:sp>
-    <dsp:sp modelId="{8CB5DCE5-D772-494C-8EF7-F1A91BF218AB}">
-      <dsp:nvSpPr>
-        <dsp:cNvPr id="0" name=""/>
-        <dsp:cNvSpPr/>
-      </dsp:nvSpPr>
-      <dsp:spPr>
-        <a:xfrm rot="10800007">
-          <a:off x="3077778" y="3477011"/>
-          <a:ext cx="1007760" cy="718924"/>
-        </a:xfrm>
-        <a:prstGeom prst="rightArrow">
-          <a:avLst>
-            <a:gd name="adj1" fmla="val 60000"/>
-            <a:gd name="adj2" fmla="val 50000"/>
-          </a:avLst>
-        </a:prstGeom>
-        <a:solidFill>
-          <a:schemeClr val="accent1">
-            <a:tint val="60000"/>
-            <a:hueOff val="0"/>
-            <a:satOff val="0"/>
-            <a:lumOff val="0"/>
-            <a:alphaOff val="0"/>
-          </a:schemeClr>
-        </a:solidFill>
-        <a:ln>
-          <a:noFill/>
-        </a:ln>
-        <a:effectLst/>
-      </dsp:spPr>
-      <dsp:style>
-        <a:lnRef idx="0">
-          <a:scrgbClr r="0" g="0" b="0"/>
-        </a:lnRef>
-        <a:fillRef idx="1">
-          <a:scrgbClr r="0" g="0" b="0"/>
-        </a:fillRef>
-        <a:effectRef idx="0">
-          <a:scrgbClr r="0" g="0" b="0"/>
-        </a:effectRef>
-        <a:fontRef idx="minor">
-          <a:schemeClr val="lt1"/>
-        </a:fontRef>
-      </dsp:style>
-      <dsp:txBody>
-        <a:bodyPr spcFirstLastPara="0" vert="horz" wrap="square" lIns="0" tIns="0" rIns="0" bIns="0" numCol="1" spcCol="1270" anchor="ctr" anchorCtr="0">
-          <a:noAutofit/>
-        </a:bodyPr>
-        <a:lstStyle/>
-        <a:p>
-          <a:pPr lvl="0" algn="ctr" defTabSz="1377950">
-            <a:lnSpc>
-              <a:spcPct val="90000"/>
-            </a:lnSpc>
-            <a:spcBef>
-              <a:spcPct val="0"/>
-            </a:spcBef>
-            <a:spcAft>
-              <a:spcPct val="35000"/>
-            </a:spcAft>
-          </a:pPr>
-          <a:endParaRPr lang="es-CL" sz="3100" kern="1200"/>
-        </a:p>
-      </dsp:txBody>
-      <dsp:txXfrm rot="10800000">
-        <a:off x="3293455" y="3620796"/>
-        <a:ext cx="792083" cy="431354"/>
-      </dsp:txXfrm>
-    </dsp:sp>
-    <dsp:sp modelId="{C7176718-3917-479F-9504-34D548C915B5}">
-      <dsp:nvSpPr>
-        <dsp:cNvPr id="0" name=""/>
-        <dsp:cNvSpPr/>
-      </dsp:nvSpPr>
-      <dsp:spPr>
-        <a:xfrm>
-          <a:off x="472272" y="2771395"/>
-          <a:ext cx="2130147" cy="2130147"/>
-        </a:xfrm>
-        <a:prstGeom prst="ellipse">
-          <a:avLst/>
-        </a:prstGeom>
-        <a:solidFill>
-          <a:srgbClr val="7030A0"/>
-        </a:solidFill>
-        <a:ln w="13970" cap="flat" cmpd="sng" algn="ctr">
-          <a:solidFill>
-            <a:schemeClr val="lt1">
-              <a:hueOff val="0"/>
-              <a:satOff val="0"/>
-              <a:lumOff val="0"/>
-              <a:alphaOff val="0"/>
-            </a:schemeClr>
-          </a:solidFill>
-          <a:prstDash val="solid"/>
-        </a:ln>
-        <a:effectLst/>
-      </dsp:spPr>
-      <dsp:style>
-        <a:lnRef idx="2">
-          <a:scrgbClr r="0" g="0" b="0"/>
-        </a:lnRef>
-        <a:fillRef idx="1">
-          <a:scrgbClr r="0" g="0" b="0"/>
-        </a:fillRef>
-        <a:effectRef idx="0">
-          <a:scrgbClr r="0" g="0" b="0"/>
-        </a:effectRef>
-        <a:fontRef idx="minor">
-          <a:schemeClr val="lt1"/>
-        </a:fontRef>
-      </dsp:style>
-      <dsp:txBody>
-        <a:bodyPr spcFirstLastPara="0" vert="horz" wrap="square" lIns="25400" tIns="25400" rIns="25400" bIns="25400" numCol="1" spcCol="1270" anchor="ctr" anchorCtr="0">
-          <a:noAutofit/>
-        </a:bodyPr>
-        <a:lstStyle/>
-        <a:p>
-          <a:pPr lvl="0" algn="ctr" defTabSz="889000">
-            <a:lnSpc>
-              <a:spcPct val="90000"/>
-            </a:lnSpc>
-            <a:spcBef>
-              <a:spcPct val="0"/>
-            </a:spcBef>
-            <a:spcAft>
-              <a:spcPct val="35000"/>
-            </a:spcAft>
-          </a:pPr>
-          <a:r>
-            <a:rPr lang="es-CL" sz="2000" kern="1200" dirty="0" smtClean="0"/>
-            <a:t>Refactorizar</a:t>
-          </a:r>
-          <a:endParaRPr lang="es-CL" sz="2000" kern="1200" dirty="0"/>
-        </a:p>
-      </dsp:txBody>
-      <dsp:txXfrm>
-        <a:off x="784225" y="3083348"/>
-        <a:ext cx="1506241" cy="1506241"/>
-      </dsp:txXfrm>
-    </dsp:sp>
-    <dsp:sp modelId="{37311926-2A8B-4C4C-A44C-204F5F0FD710}">
-      <dsp:nvSpPr>
-        <dsp:cNvPr id="0" name=""/>
-        <dsp:cNvSpPr/>
-      </dsp:nvSpPr>
-      <dsp:spPr>
-        <a:xfrm rot="18675958">
-          <a:off x="2294506" y="2313208"/>
-          <a:ext cx="528076" cy="718924"/>
-        </a:xfrm>
-        <a:prstGeom prst="rightArrow">
-          <a:avLst>
-            <a:gd name="adj1" fmla="val 60000"/>
-            <a:gd name="adj2" fmla="val 50000"/>
-          </a:avLst>
-        </a:prstGeom>
-        <a:solidFill>
-          <a:schemeClr val="accent1">
-            <a:tint val="60000"/>
-            <a:hueOff val="0"/>
-            <a:satOff val="0"/>
-            <a:lumOff val="0"/>
-            <a:alphaOff val="0"/>
-          </a:schemeClr>
-        </a:solidFill>
-        <a:ln>
-          <a:noFill/>
-        </a:ln>
-        <a:effectLst/>
-      </dsp:spPr>
-      <dsp:style>
-        <a:lnRef idx="0">
-          <a:scrgbClr r="0" g="0" b="0"/>
-        </a:lnRef>
-        <a:fillRef idx="1">
-          <a:scrgbClr r="0" g="0" b="0"/>
-        </a:fillRef>
-        <a:effectRef idx="0">
-          <a:scrgbClr r="0" g="0" b="0"/>
-        </a:effectRef>
-        <a:fontRef idx="minor">
-          <a:schemeClr val="lt1"/>
-        </a:fontRef>
-      </dsp:style>
-      <dsp:txBody>
-        <a:bodyPr spcFirstLastPara="0" vert="horz" wrap="square" lIns="0" tIns="0" rIns="0" bIns="0" numCol="1" spcCol="1270" anchor="ctr" anchorCtr="0">
-          <a:noAutofit/>
-        </a:bodyPr>
-        <a:lstStyle/>
-        <a:p>
-          <a:pPr lvl="0" algn="ctr" defTabSz="1377950">
-            <a:lnSpc>
-              <a:spcPct val="90000"/>
-            </a:lnSpc>
-            <a:spcBef>
-              <a:spcPct val="0"/>
-            </a:spcBef>
-            <a:spcAft>
-              <a:spcPct val="35000"/>
-            </a:spcAft>
-          </a:pPr>
-          <a:endParaRPr lang="es-CL" sz="3100" kern="1200"/>
-        </a:p>
-      </dsp:txBody>
-      <dsp:txXfrm>
-        <a:off x="2321473" y="2516533"/>
-        <a:ext cx="369653" cy="431354"/>
-      </dsp:txXfrm>
-    </dsp:sp>
   </dsp:spTree>
 </dsp:drawing>
 </file>
@@ -4159,27 +3737,17 @@
               <a:rPr lang="es-CL" dirty="0" smtClean="0"/>
               <a:t> 11. </a:t>
             </a:r>
-            <a:endParaRPr lang="es-CL" dirty="0" smtClean="0"/>
           </a:p>
           <a:p>
             <a:r>
               <a:rPr lang="es-CL" dirty="0" smtClean="0"/>
-              <a:t>La </a:t>
-            </a:r>
+              <a:t>La base de datos fue diseñada respetando la forma normal 3. </a:t>
+            </a:r>
+          </a:p>
+          <a:p>
             <a:r>
               <a:rPr lang="es-CL" dirty="0" smtClean="0"/>
-              <a:t>base de datos fue diseñada respetando la forma normal 3. </a:t>
-            </a:r>
-            <a:endParaRPr lang="es-CL" dirty="0" smtClean="0"/>
-          </a:p>
-          <a:p>
-            <a:r>
-              <a:rPr lang="es-CL" dirty="0" smtClean="0"/>
-              <a:t>Las </a:t>
-            </a:r>
-            <a:r>
-              <a:rPr lang="es-CL" dirty="0" smtClean="0"/>
-              <a:t>tablas están debidamente documentadas en un diccionario de datos.</a:t>
+              <a:t>Las tablas están debidamente documentadas en un diccionario de datos.</a:t>
             </a:r>
           </a:p>
           <a:p>
@@ -4328,7 +3896,7 @@
           <a:p>
             <a:fld id="{DF2599EA-3C95-46C0-99A8-B5EBCBCDB69B}" type="slidenum">
               <a:rPr lang="es-CL" smtClean="0"/>
-              <a:t>17</a:t>
+              <a:t>18</a:t>
             </a:fld>
             <a:endParaRPr lang="es-CL"/>
           </a:p>
@@ -4460,24 +4028,43 @@
             </a:pPr>
             <a:r>
               <a:rPr lang="es-CL" dirty="0" smtClean="0"/>
-              <a:t>GUI: </a:t>
+              <a:t>UI</a:t>
+            </a:r>
+            <a:r>
+              <a:rPr lang="es-CL" dirty="0" smtClean="0"/>
+              <a:t>: </a:t>
             </a:r>
             <a:r>
               <a:rPr lang="es-CL" dirty="0" err="1" smtClean="0"/>
-              <a:t>Graphical</a:t>
+              <a:t>User</a:t>
             </a:r>
             <a:r>
               <a:rPr lang="es-CL" dirty="0" smtClean="0"/>
               <a:t> </a:t>
             </a:r>
             <a:r>
+              <a:rPr lang="es-CL" dirty="0" smtClean="0"/>
+              <a:t>Interface: no implementado. Contiene la lógica de la interfaz de usuario y las validaciones del lado del cliente</a:t>
+            </a:r>
+            <a:r>
+              <a:rPr lang="es-CL" dirty="0" smtClean="0"/>
+              <a:t>.</a:t>
+            </a:r>
+          </a:p>
+          <a:p>
+            <a:pPr marL="228600" indent="-228600">
+              <a:buFont typeface="+mj-lt"/>
+              <a:buAutoNum type="arabicPeriod"/>
+            </a:pPr>
+            <a:r>
               <a:rPr lang="es-CL" dirty="0" err="1" smtClean="0"/>
-              <a:t>User</a:t>
+              <a:t>Tests</a:t>
             </a:r>
             <a:r>
               <a:rPr lang="es-CL" dirty="0" smtClean="0"/>
-              <a:t> Interface: no implementado. Contiene la lógica de la interfaz de usuario y las validaciones del lado del cliente.</a:t>
-            </a:r>
+              <a:t>: Pruebas de la capa de negocio</a:t>
+            </a:r>
+            <a:endParaRPr lang="es-CL" dirty="0" smtClean="0"/>
           </a:p>
           <a:p>
             <a:endParaRPr lang="es-CL" dirty="0"/>
@@ -4501,7 +4088,7 @@
           <a:p>
             <a:fld id="{DF2599EA-3C95-46C0-99A8-B5EBCBCDB69B}" type="slidenum">
               <a:rPr lang="es-CL" smtClean="0"/>
-              <a:t>18</a:t>
+              <a:t>19</a:t>
             </a:fld>
             <a:endParaRPr lang="es-CL"/>
           </a:p>
@@ -4674,7 +4261,7 @@
           <a:p>
             <a:fld id="{DF2599EA-3C95-46C0-99A8-B5EBCBCDB69B}" type="slidenum">
               <a:rPr lang="es-CL" smtClean="0"/>
-              <a:t>19</a:t>
+              <a:t>20</a:t>
             </a:fld>
             <a:endParaRPr lang="es-CL"/>
           </a:p>
@@ -11626,29 +11213,6 @@
       </p:grpSpPr>
       <p:sp>
         <p:nvSpPr>
-          <p:cNvPr id="2" name="Title 1"/>
-          <p:cNvSpPr>
-            <a:spLocks noGrp="1"/>
-          </p:cNvSpPr>
-          <p:nvPr>
-            <p:ph type="title"/>
-          </p:nvPr>
-        </p:nvSpPr>
-        <p:spPr/>
-        <p:txBody>
-          <a:bodyPr/>
-          <a:lstStyle/>
-          <a:p>
-            <a:r>
-              <a:rPr lang="es-ES_tradnl" dirty="0" smtClean="0"/>
-              <a:t>Modelo de clases</a:t>
-            </a:r>
-            <a:endParaRPr lang="es-ES_tradnl" dirty="0"/>
-          </a:p>
-        </p:txBody>
-      </p:sp>
-      <p:sp>
-        <p:nvSpPr>
           <p:cNvPr id="4" name="Slide Number Placeholder 3"/>
           <p:cNvSpPr>
             <a:spLocks noGrp="1"/>
@@ -11667,6 +11231,230 @@
             <a:fld id="{66B77C49-310C-4D67-A641-7D2CCF3E3B8A}" type="slidenum">
               <a:rPr lang="es-ES_tradnl" smtClean="0"/>
               <a:t>17</a:t>
+            </a:fld>
+            <a:endParaRPr lang="es-ES_tradnl" dirty="0"/>
+          </a:p>
+        </p:txBody>
+      </p:sp>
+      <p:sp>
+        <p:nvSpPr>
+          <p:cNvPr id="7" name="Title 6"/>
+          <p:cNvSpPr>
+            <a:spLocks noGrp="1"/>
+          </p:cNvSpPr>
+          <p:nvPr>
+            <p:ph type="title"/>
+          </p:nvPr>
+        </p:nvSpPr>
+        <p:spPr/>
+        <p:txBody>
+          <a:bodyPr/>
+          <a:lstStyle/>
+          <a:p>
+            <a:r>
+              <a:rPr lang="es-ES_tradnl" dirty="0" smtClean="0"/>
+              <a:t>Diccionario de datos</a:t>
+            </a:r>
+            <a:endParaRPr lang="es-ES_tradnl" dirty="0"/>
+          </a:p>
+        </p:txBody>
+      </p:sp>
+      <p:sp>
+        <p:nvSpPr>
+          <p:cNvPr id="2" name="TextBox 1"/>
+          <p:cNvSpPr txBox="1"/>
+          <p:nvPr/>
+        </p:nvSpPr>
+        <p:spPr>
+          <a:xfrm>
+            <a:off x="3373461" y="6099730"/>
+            <a:ext cx="4979248" cy="369332"/>
+          </a:xfrm>
+          <a:prstGeom prst="rect">
+            <a:avLst/>
+          </a:prstGeom>
+          <a:noFill/>
+        </p:spPr>
+        <p:txBody>
+          <a:bodyPr wrap="none" rtlCol="0">
+            <a:spAutoFit/>
+          </a:bodyPr>
+          <a:lstStyle/>
+          <a:p>
+            <a:pPr algn="ctr"/>
+            <a:r>
+              <a:rPr lang="es-ES_tradnl" dirty="0" smtClean="0"/>
+              <a:t>Fig. </a:t>
+            </a:r>
+            <a:r>
+              <a:rPr lang="es-ES_tradnl" dirty="0" smtClean="0"/>
+              <a:t>9: Diccionario de datos de tabla Paciente</a:t>
+            </a:r>
+            <a:endParaRPr lang="es-ES_tradnl" dirty="0"/>
+          </a:p>
+        </p:txBody>
+      </p:sp>
+      <p:pic>
+        <p:nvPicPr>
+          <p:cNvPr id="6" name="Picture 2" descr="Resultado de imagen para duoc"/>
+          <p:cNvPicPr>
+            <a:picLocks noChangeAspect="1" noChangeArrowheads="1"/>
+          </p:cNvPicPr>
+          <p:nvPr/>
+        </p:nvPicPr>
+        <p:blipFill rotWithShape="1">
+          <a:blip r:embed="rId2">
+            <a:extLst>
+              <a:ext uri="{28A0092B-C50C-407E-A947-70E740481C1C}">
+                <a14:useLocalDpi xmlns:a14="http://schemas.microsoft.com/office/drawing/2010/main" val="0"/>
+              </a:ext>
+            </a:extLst>
+          </a:blip>
+          <a:srcRect t="13892" r="19022"/>
+          <a:stretch/>
+        </p:blipFill>
+        <p:spPr bwMode="auto">
+          <a:xfrm>
+            <a:off x="9023169" y="378822"/>
+            <a:ext cx="2001883" cy="524910"/>
+          </a:xfrm>
+          <a:prstGeom prst="rect">
+            <a:avLst/>
+          </a:prstGeom>
+          <a:noFill/>
+          <a:extLst>
+            <a:ext uri="{909E8E84-426E-40DD-AFC4-6F175D3DCCD1}">
+              <a14:hiddenFill xmlns:a14="http://schemas.microsoft.com/office/drawing/2010/main">
+                <a:solidFill>
+                  <a:srgbClr val="FFFFFF"/>
+                </a:solidFill>
+              </a14:hiddenFill>
+            </a:ext>
+          </a:extLst>
+        </p:spPr>
+      </p:pic>
+      <p:pic>
+        <p:nvPicPr>
+          <p:cNvPr id="3" name="Imagen 2"/>
+          <p:cNvPicPr>
+            <a:picLocks noChangeAspect="1"/>
+          </p:cNvPicPr>
+          <p:nvPr/>
+        </p:nvPicPr>
+        <p:blipFill>
+          <a:blip r:embed="rId3">
+            <a:extLst>
+              <a:ext uri="{28A0092B-C50C-407E-A947-70E740481C1C}">
+                <a14:useLocalDpi xmlns:a14="http://schemas.microsoft.com/office/drawing/2010/main" val="0"/>
+              </a:ext>
+            </a:extLst>
+          </a:blip>
+          <a:stretch>
+            <a:fillRect/>
+          </a:stretch>
+        </p:blipFill>
+        <p:spPr>
+          <a:xfrm>
+            <a:off x="2479494" y="1775946"/>
+            <a:ext cx="6543675" cy="4257675"/>
+          </a:xfrm>
+          <a:prstGeom prst="rect">
+            <a:avLst/>
+          </a:prstGeom>
+        </p:spPr>
+      </p:pic>
+    </p:spTree>
+    <p:extLst>
+      <p:ext uri="{BB962C8B-B14F-4D97-AF65-F5344CB8AC3E}">
+        <p14:creationId xmlns:p14="http://schemas.microsoft.com/office/powerpoint/2010/main" val="2933652858"/>
+      </p:ext>
+    </p:extLst>
+  </p:cSld>
+  <p:clrMapOvr>
+    <a:masterClrMapping/>
+  </p:clrMapOvr>
+  <mc:AlternateContent xmlns:mc="http://schemas.openxmlformats.org/markup-compatibility/2006" xmlns:p14="http://schemas.microsoft.com/office/powerpoint/2010/main">
+    <mc:Choice Requires="p14">
+      <p:transition p14:dur="150">
+        <p:fade/>
+      </p:transition>
+    </mc:Choice>
+    <mc:Fallback xmlns="">
+      <p:transition>
+        <p:fade/>
+      </p:transition>
+    </mc:Fallback>
+  </mc:AlternateContent>
+  <p:timing>
+    <p:tnLst>
+      <p:par>
+        <p:cTn id="1" dur="indefinite" restart="never" nodeType="tmRoot"/>
+      </p:par>
+    </p:tnLst>
+  </p:timing>
+</p:sld>
+</file>
+
+<file path=ppt/slides/slide19.xml><?xml version="1.0" encoding="utf-8"?>
+<p:sld xmlns:a="http://schemas.openxmlformats.org/drawingml/2006/main" xmlns:r="http://schemas.openxmlformats.org/officeDocument/2006/relationships" xmlns:p="http://schemas.openxmlformats.org/presentationml/2006/main">
+  <p:cSld>
+    <p:spTree>
+      <p:nvGrpSpPr>
+        <p:cNvPr id="1" name=""/>
+        <p:cNvGrpSpPr/>
+        <p:nvPr/>
+      </p:nvGrpSpPr>
+      <p:grpSpPr>
+        <a:xfrm>
+          <a:off x="0" y="0"/>
+          <a:ext cx="0" cy="0"/>
+          <a:chOff x="0" y="0"/>
+          <a:chExt cx="0" cy="0"/>
+        </a:xfrm>
+      </p:grpSpPr>
+      <p:sp>
+        <p:nvSpPr>
+          <p:cNvPr id="2" name="Title 1"/>
+          <p:cNvSpPr>
+            <a:spLocks noGrp="1"/>
+          </p:cNvSpPr>
+          <p:nvPr>
+            <p:ph type="title"/>
+          </p:nvPr>
+        </p:nvSpPr>
+        <p:spPr/>
+        <p:txBody>
+          <a:bodyPr/>
+          <a:lstStyle/>
+          <a:p>
+            <a:r>
+              <a:rPr lang="es-ES_tradnl" dirty="0" smtClean="0"/>
+              <a:t>Modelo de clases</a:t>
+            </a:r>
+            <a:endParaRPr lang="es-ES_tradnl" dirty="0"/>
+          </a:p>
+        </p:txBody>
+      </p:sp>
+      <p:sp>
+        <p:nvSpPr>
+          <p:cNvPr id="4" name="Slide Number Placeholder 3"/>
+          <p:cNvSpPr>
+            <a:spLocks noGrp="1"/>
+          </p:cNvSpPr>
+          <p:nvPr>
+            <p:ph type="sldNum" sz="quarter" idx="12"/>
+          </p:nvPr>
+        </p:nvSpPr>
+        <p:spPr/>
+        <p:txBody>
+          <a:bodyPr>
+            <a:normAutofit lnSpcReduction="10000"/>
+          </a:bodyPr>
+          <a:lstStyle/>
+          <a:p>
+            <a:fld id="{66B77C49-310C-4D67-A641-7D2CCF3E3B8A}" type="slidenum">
+              <a:rPr lang="es-ES_tradnl" smtClean="0"/>
+              <a:t>18</a:t>
             </a:fld>
             <a:endParaRPr lang="es-ES_tradnl" dirty="0"/>
           </a:p>
@@ -11733,7 +11521,7 @@
         </p:blipFill>
         <p:spPr>
           <a:xfrm>
-            <a:off x="1261872" y="2035459"/>
+            <a:off x="1581721" y="2035459"/>
             <a:ext cx="4526471" cy="3929502"/>
           </a:xfrm>
           <a:prstGeom prst="rect">
@@ -11762,7 +11550,7 @@
         </p:blipFill>
         <p:spPr>
           <a:xfrm>
-            <a:off x="7624666" y="1775946"/>
+            <a:off x="7421466" y="1775946"/>
             <a:ext cx="1795988" cy="2224264"/>
           </a:xfrm>
           <a:prstGeom prst="rect">
@@ -11792,7 +11580,7 @@
         </p:blipFill>
         <p:spPr>
           <a:xfrm>
-            <a:off x="7620560" y="4250267"/>
+            <a:off x="7417360" y="4250267"/>
             <a:ext cx="1800094" cy="1714694"/>
           </a:xfrm>
           <a:prstGeom prst="rect">
@@ -11832,7 +11620,7 @@
 </p:sld>
 </file>
 
-<file path=ppt/slides/slide19.xml><?xml version="1.0" encoding="utf-8"?>
+<file path=ppt/slides/slide2.xml><?xml version="1.0" encoding="utf-8"?>
 <p:sld xmlns:a="http://schemas.openxmlformats.org/drawingml/2006/main" xmlns:r="http://schemas.openxmlformats.org/officeDocument/2006/relationships" xmlns:p="http://schemas.openxmlformats.org/presentationml/2006/main">
   <p:cSld>
     <p:spTree>
@@ -11865,10 +11653,104 @@
           <a:lstStyle/>
           <a:p>
             <a:r>
-              <a:rPr lang="es-ES_tradnl" dirty="0" smtClean="0"/>
-              <a:t>Modelo de clases</a:t>
-            </a:r>
-            <a:endParaRPr lang="es-ES_tradnl" dirty="0"/>
+              <a:rPr lang="en-US" dirty="0" smtClean="0"/>
+              <a:t>Agenda</a:t>
+            </a:r>
+            <a:endParaRPr lang="en-US" dirty="0"/>
+          </a:p>
+        </p:txBody>
+      </p:sp>
+      <p:sp>
+        <p:nvSpPr>
+          <p:cNvPr id="3" name="Content Placeholder 2"/>
+          <p:cNvSpPr>
+            <a:spLocks noGrp="1"/>
+          </p:cNvSpPr>
+          <p:nvPr>
+            <p:ph idx="1"/>
+          </p:nvPr>
+        </p:nvSpPr>
+        <p:spPr/>
+        <p:txBody>
+          <a:bodyPr>
+            <a:normAutofit fontScale="92500" lnSpcReduction="10000"/>
+          </a:bodyPr>
+          <a:lstStyle/>
+          <a:p>
+            <a:r>
+              <a:rPr lang="es-ES_tradnl" sz="3200" dirty="0" smtClean="0"/>
+              <a:t>Cliente y problemática</a:t>
+            </a:r>
+          </a:p>
+          <a:p>
+            <a:r>
+              <a:rPr lang="es-ES_tradnl" sz="3200" dirty="0" smtClean="0"/>
+              <a:t>Iteración 1: Planificación del proyecto</a:t>
+            </a:r>
+            <a:endParaRPr lang="es-ES_tradnl" sz="3000" dirty="0" smtClean="0"/>
+          </a:p>
+          <a:p>
+            <a:pPr lvl="1"/>
+            <a:r>
+              <a:rPr lang="es-ES_tradnl" sz="3000" dirty="0" smtClean="0"/>
+              <a:t>Alcance</a:t>
+            </a:r>
+          </a:p>
+          <a:p>
+            <a:pPr lvl="1"/>
+            <a:r>
+              <a:rPr lang="es-ES_tradnl" sz="3000" dirty="0" smtClean="0"/>
+              <a:t>Organización del equipo</a:t>
+            </a:r>
+          </a:p>
+          <a:p>
+            <a:pPr lvl="1"/>
+            <a:r>
+              <a:rPr lang="es-ES_tradnl" sz="3000" dirty="0" smtClean="0"/>
+              <a:t>Calendarización y entregables</a:t>
+            </a:r>
+            <a:endParaRPr lang="es-ES_tradnl" sz="2800" dirty="0" smtClean="0"/>
+          </a:p>
+          <a:p>
+            <a:r>
+              <a:rPr lang="es-ES_tradnl" sz="3200" dirty="0" smtClean="0"/>
+              <a:t>Iteración 2: Diseño y construcción de </a:t>
+            </a:r>
+            <a:r>
+              <a:rPr lang="es-ES_tradnl" sz="3200" dirty="0" err="1" smtClean="0"/>
+              <a:t>backend</a:t>
+            </a:r>
+            <a:endParaRPr lang="es-ES_tradnl" sz="3200" dirty="0" smtClean="0"/>
+          </a:p>
+          <a:p>
+            <a:pPr lvl="1"/>
+            <a:r>
+              <a:rPr lang="es-ES_tradnl" sz="3000" dirty="0" smtClean="0"/>
+              <a:t>Arquitectura</a:t>
+            </a:r>
+          </a:p>
+          <a:p>
+            <a:pPr lvl="1"/>
+            <a:r>
+              <a:rPr lang="es-ES_tradnl" sz="3000" dirty="0"/>
+              <a:t>Modelo de clases, </a:t>
+            </a:r>
+            <a:r>
+              <a:rPr lang="es-ES_tradnl" sz="3000" dirty="0" smtClean="0"/>
+              <a:t>construcción y </a:t>
+            </a:r>
+            <a:r>
+              <a:rPr lang="es-ES_tradnl" sz="3000" dirty="0" err="1" smtClean="0"/>
+              <a:t>testing</a:t>
+            </a:r>
+            <a:endParaRPr lang="es-ES_tradnl" sz="3000" dirty="0" smtClean="0"/>
+          </a:p>
+          <a:p>
+            <a:pPr lvl="1"/>
+            <a:r>
+              <a:rPr lang="es-ES_tradnl" sz="3000" dirty="0" smtClean="0"/>
+              <a:t>Modelo de datos</a:t>
+            </a:r>
           </a:p>
         </p:txBody>
       </p:sp>
@@ -11890,8 +11772,144 @@
           <a:lstStyle/>
           <a:p>
             <a:fld id="{66B77C49-310C-4D67-A641-7D2CCF3E3B8A}" type="slidenum">
+              <a:rPr lang="es-CL" smtClean="0"/>
+              <a:t>1</a:t>
+            </a:fld>
+            <a:endParaRPr lang="es-CL"/>
+          </a:p>
+        </p:txBody>
+      </p:sp>
+      <p:pic>
+        <p:nvPicPr>
+          <p:cNvPr id="5" name="Picture 2" descr="Resultado de imagen para duoc"/>
+          <p:cNvPicPr>
+            <a:picLocks noChangeAspect="1" noChangeArrowheads="1"/>
+          </p:cNvPicPr>
+          <p:nvPr/>
+        </p:nvPicPr>
+        <p:blipFill rotWithShape="1">
+          <a:blip r:embed="rId3">
+            <a:extLst>
+              <a:ext uri="{28A0092B-C50C-407E-A947-70E740481C1C}">
+                <a14:useLocalDpi xmlns:a14="http://schemas.microsoft.com/office/drawing/2010/main" val="0"/>
+              </a:ext>
+            </a:extLst>
+          </a:blip>
+          <a:srcRect t="13892" r="19022"/>
+          <a:stretch/>
+        </p:blipFill>
+        <p:spPr bwMode="auto">
+          <a:xfrm>
+            <a:off x="9023169" y="378822"/>
+            <a:ext cx="2001883" cy="524910"/>
+          </a:xfrm>
+          <a:prstGeom prst="rect">
+            <a:avLst/>
+          </a:prstGeom>
+          <a:noFill/>
+          <a:extLst>
+            <a:ext uri="{909E8E84-426E-40DD-AFC4-6F175D3DCCD1}">
+              <a14:hiddenFill xmlns:a14="http://schemas.microsoft.com/office/drawing/2010/main">
+                <a:solidFill>
+                  <a:srgbClr val="FFFFFF"/>
+                </a:solidFill>
+              </a14:hiddenFill>
+            </a:ext>
+          </a:extLst>
+        </p:spPr>
+      </p:pic>
+    </p:spTree>
+    <p:extLst>
+      <p:ext uri="{BB962C8B-B14F-4D97-AF65-F5344CB8AC3E}">
+        <p14:creationId xmlns:p14="http://schemas.microsoft.com/office/powerpoint/2010/main" val="1313367284"/>
+      </p:ext>
+    </p:extLst>
+  </p:cSld>
+  <p:clrMapOvr>
+    <a:masterClrMapping/>
+  </p:clrMapOvr>
+  <mc:AlternateContent xmlns:mc="http://schemas.openxmlformats.org/markup-compatibility/2006" xmlns:p14="http://schemas.microsoft.com/office/powerpoint/2010/main">
+    <mc:Choice Requires="p14">
+      <p:transition p14:dur="150">
+        <p:fade/>
+      </p:transition>
+    </mc:Choice>
+    <mc:Fallback xmlns="">
+      <p:transition>
+        <p:fade/>
+      </p:transition>
+    </mc:Fallback>
+  </mc:AlternateContent>
+  <p:timing>
+    <p:tnLst>
+      <p:par>
+        <p:cTn id="1" dur="indefinite" restart="never" nodeType="tmRoot"/>
+      </p:par>
+    </p:tnLst>
+  </p:timing>
+</p:sld>
+</file>
+
+<file path=ppt/slides/slide20.xml><?xml version="1.0" encoding="utf-8"?>
+<p:sld xmlns:a="http://schemas.openxmlformats.org/drawingml/2006/main" xmlns:r="http://schemas.openxmlformats.org/officeDocument/2006/relationships" xmlns:p="http://schemas.openxmlformats.org/presentationml/2006/main">
+  <p:cSld>
+    <p:spTree>
+      <p:nvGrpSpPr>
+        <p:cNvPr id="1" name=""/>
+        <p:cNvGrpSpPr/>
+        <p:nvPr/>
+      </p:nvGrpSpPr>
+      <p:grpSpPr>
+        <a:xfrm>
+          <a:off x="0" y="0"/>
+          <a:ext cx="0" cy="0"/>
+          <a:chOff x="0" y="0"/>
+          <a:chExt cx="0" cy="0"/>
+        </a:xfrm>
+      </p:grpSpPr>
+      <p:sp>
+        <p:nvSpPr>
+          <p:cNvPr id="2" name="Title 1"/>
+          <p:cNvSpPr>
+            <a:spLocks noGrp="1"/>
+          </p:cNvSpPr>
+          <p:nvPr>
+            <p:ph type="title"/>
+          </p:nvPr>
+        </p:nvSpPr>
+        <p:spPr/>
+        <p:txBody>
+          <a:bodyPr/>
+          <a:lstStyle/>
+          <a:p>
+            <a:r>
+              <a:rPr lang="es-ES_tradnl" dirty="0" smtClean="0"/>
+              <a:t>Modelo de clases</a:t>
+            </a:r>
+            <a:endParaRPr lang="es-ES_tradnl" dirty="0"/>
+          </a:p>
+        </p:txBody>
+      </p:sp>
+      <p:sp>
+        <p:nvSpPr>
+          <p:cNvPr id="4" name="Slide Number Placeholder 3"/>
+          <p:cNvSpPr>
+            <a:spLocks noGrp="1"/>
+          </p:cNvSpPr>
+          <p:nvPr>
+            <p:ph type="sldNum" sz="quarter" idx="12"/>
+          </p:nvPr>
+        </p:nvSpPr>
+        <p:spPr/>
+        <p:txBody>
+          <a:bodyPr>
+            <a:normAutofit lnSpcReduction="10000"/>
+          </a:bodyPr>
+          <a:lstStyle/>
+          <a:p>
+            <a:fld id="{66B77C49-310C-4D67-A641-7D2CCF3E3B8A}" type="slidenum">
               <a:rPr lang="es-ES_tradnl" smtClean="0"/>
-              <a:t>18</a:t>
+              <a:t>19</a:t>
             </a:fld>
             <a:endParaRPr lang="es-ES_tradnl" dirty="0"/>
           </a:p>
@@ -11998,7 +12016,7 @@
 </p:sld>
 </file>
 
-<file path=ppt/slides/slide2.xml><?xml version="1.0" encoding="utf-8"?>
+<file path=ppt/slides/slide21.xml><?xml version="1.0" encoding="utf-8"?>
 <p:sld xmlns:a="http://schemas.openxmlformats.org/drawingml/2006/main" xmlns:r="http://schemas.openxmlformats.org/officeDocument/2006/relationships" xmlns:p="http://schemas.openxmlformats.org/presentationml/2006/main">
   <p:cSld>
     <p:spTree>
@@ -12031,104 +12049,14 @@
           <a:lstStyle/>
           <a:p>
             <a:r>
-              <a:rPr lang="en-US" dirty="0" smtClean="0"/>
-              <a:t>Agenda</a:t>
-            </a:r>
-            <a:endParaRPr lang="en-US" dirty="0"/>
-          </a:p>
-        </p:txBody>
-      </p:sp>
-      <p:sp>
-        <p:nvSpPr>
-          <p:cNvPr id="3" name="Content Placeholder 2"/>
-          <p:cNvSpPr>
-            <a:spLocks noGrp="1"/>
-          </p:cNvSpPr>
-          <p:nvPr>
-            <p:ph idx="1"/>
-          </p:nvPr>
-        </p:nvSpPr>
-        <p:spPr/>
-        <p:txBody>
-          <a:bodyPr>
-            <a:normAutofit fontScale="92500" lnSpcReduction="10000"/>
-          </a:bodyPr>
-          <a:lstStyle/>
-          <a:p>
-            <a:r>
-              <a:rPr lang="es-ES_tradnl" sz="3200" dirty="0" smtClean="0"/>
-              <a:t>Cliente y problemática</a:t>
-            </a:r>
-          </a:p>
-          <a:p>
-            <a:r>
-              <a:rPr lang="es-ES_tradnl" sz="3200" dirty="0" smtClean="0"/>
-              <a:t>Iteración 1: Planificación del proyecto</a:t>
-            </a:r>
-            <a:endParaRPr lang="es-ES_tradnl" sz="3000" dirty="0" smtClean="0"/>
-          </a:p>
-          <a:p>
-            <a:pPr lvl="1"/>
-            <a:r>
-              <a:rPr lang="es-ES_tradnl" sz="3000" dirty="0" smtClean="0"/>
-              <a:t>Alcance</a:t>
-            </a:r>
-          </a:p>
-          <a:p>
-            <a:pPr lvl="1"/>
-            <a:r>
-              <a:rPr lang="es-ES_tradnl" sz="3000" dirty="0" smtClean="0"/>
-              <a:t>Organización del equipo</a:t>
-            </a:r>
-          </a:p>
-          <a:p>
-            <a:pPr lvl="1"/>
-            <a:r>
-              <a:rPr lang="es-ES_tradnl" sz="3000" dirty="0" smtClean="0"/>
-              <a:t>Calendarización y entregables</a:t>
-            </a:r>
-            <a:endParaRPr lang="es-ES_tradnl" sz="2800" dirty="0" smtClean="0"/>
-          </a:p>
-          <a:p>
-            <a:r>
-              <a:rPr lang="es-ES_tradnl" sz="3200" dirty="0" smtClean="0"/>
-              <a:t>Iteración 2: Diseño y construcción de </a:t>
-            </a:r>
-            <a:r>
-              <a:rPr lang="es-ES_tradnl" sz="3200" dirty="0" err="1" smtClean="0"/>
-              <a:t>backend</a:t>
-            </a:r>
-            <a:endParaRPr lang="es-ES_tradnl" sz="3200" dirty="0" smtClean="0"/>
-          </a:p>
-          <a:p>
-            <a:pPr lvl="1"/>
-            <a:r>
-              <a:rPr lang="es-ES_tradnl" sz="3000" dirty="0" smtClean="0"/>
-              <a:t>Arquitectura</a:t>
-            </a:r>
-          </a:p>
-          <a:p>
-            <a:pPr lvl="1"/>
-            <a:r>
-              <a:rPr lang="es-ES_tradnl" sz="3000" dirty="0"/>
-              <a:t>Modelo de clases, </a:t>
-            </a:r>
-            <a:r>
-              <a:rPr lang="es-ES_tradnl" sz="3000" dirty="0" smtClean="0"/>
-              <a:t>construcción y </a:t>
-            </a:r>
-            <a:r>
-              <a:rPr lang="es-ES_tradnl" sz="3000" dirty="0" err="1" smtClean="0"/>
+              <a:rPr lang="es-ES_tradnl" dirty="0" smtClean="0"/>
+              <a:t>Metodología orientada a </a:t>
+            </a:r>
+            <a:r>
+              <a:rPr lang="es-ES_tradnl" dirty="0" err="1" smtClean="0"/>
               <a:t>testing</a:t>
             </a:r>
-            <a:endParaRPr lang="es-ES_tradnl" sz="3000" dirty="0" smtClean="0"/>
-          </a:p>
-          <a:p>
-            <a:pPr lvl="1"/>
-            <a:r>
-              <a:rPr lang="es-ES_tradnl" sz="3000" dirty="0" smtClean="0"/>
-              <a:t>Modelo de datos</a:t>
-            </a:r>
+            <a:endParaRPr lang="es-ES_tradnl" dirty="0"/>
           </a:p>
         </p:txBody>
       </p:sp>
@@ -12150,148 +12078,8 @@
           <a:lstStyle/>
           <a:p>
             <a:fld id="{66B77C49-310C-4D67-A641-7D2CCF3E3B8A}" type="slidenum">
-              <a:rPr lang="es-CL" smtClean="0"/>
-              <a:t>1</a:t>
-            </a:fld>
-            <a:endParaRPr lang="es-CL"/>
-          </a:p>
-        </p:txBody>
-      </p:sp>
-      <p:pic>
-        <p:nvPicPr>
-          <p:cNvPr id="5" name="Picture 2" descr="Resultado de imagen para duoc"/>
-          <p:cNvPicPr>
-            <a:picLocks noChangeAspect="1" noChangeArrowheads="1"/>
-          </p:cNvPicPr>
-          <p:nvPr/>
-        </p:nvPicPr>
-        <p:blipFill rotWithShape="1">
-          <a:blip r:embed="rId3">
-            <a:extLst>
-              <a:ext uri="{28A0092B-C50C-407E-A947-70E740481C1C}">
-                <a14:useLocalDpi xmlns:a14="http://schemas.microsoft.com/office/drawing/2010/main" val="0"/>
-              </a:ext>
-            </a:extLst>
-          </a:blip>
-          <a:srcRect t="13892" r="19022"/>
-          <a:stretch/>
-        </p:blipFill>
-        <p:spPr bwMode="auto">
-          <a:xfrm>
-            <a:off x="9023169" y="378822"/>
-            <a:ext cx="2001883" cy="524910"/>
-          </a:xfrm>
-          <a:prstGeom prst="rect">
-            <a:avLst/>
-          </a:prstGeom>
-          <a:noFill/>
-          <a:extLst>
-            <a:ext uri="{909E8E84-426E-40DD-AFC4-6F175D3DCCD1}">
-              <a14:hiddenFill xmlns:a14="http://schemas.microsoft.com/office/drawing/2010/main">
-                <a:solidFill>
-                  <a:srgbClr val="FFFFFF"/>
-                </a:solidFill>
-              </a14:hiddenFill>
-            </a:ext>
-          </a:extLst>
-        </p:spPr>
-      </p:pic>
-    </p:spTree>
-    <p:extLst>
-      <p:ext uri="{BB962C8B-B14F-4D97-AF65-F5344CB8AC3E}">
-        <p14:creationId xmlns:p14="http://schemas.microsoft.com/office/powerpoint/2010/main" val="1313367284"/>
-      </p:ext>
-    </p:extLst>
-  </p:cSld>
-  <p:clrMapOvr>
-    <a:masterClrMapping/>
-  </p:clrMapOvr>
-  <mc:AlternateContent xmlns:mc="http://schemas.openxmlformats.org/markup-compatibility/2006" xmlns:p14="http://schemas.microsoft.com/office/powerpoint/2010/main">
-    <mc:Choice Requires="p14">
-      <p:transition p14:dur="150">
-        <p:fade/>
-      </p:transition>
-    </mc:Choice>
-    <mc:Fallback xmlns="">
-      <p:transition>
-        <p:fade/>
-      </p:transition>
-    </mc:Fallback>
-  </mc:AlternateContent>
-  <p:timing>
-    <p:tnLst>
-      <p:par>
-        <p:cTn id="1" dur="indefinite" restart="never" nodeType="tmRoot"/>
-      </p:par>
-    </p:tnLst>
-  </p:timing>
-</p:sld>
-</file>
-
-<file path=ppt/slides/slide20.xml><?xml version="1.0" encoding="utf-8"?>
-<p:sld xmlns:a="http://schemas.openxmlformats.org/drawingml/2006/main" xmlns:r="http://schemas.openxmlformats.org/officeDocument/2006/relationships" xmlns:p="http://schemas.openxmlformats.org/presentationml/2006/main">
-  <p:cSld>
-    <p:spTree>
-      <p:nvGrpSpPr>
-        <p:cNvPr id="1" name=""/>
-        <p:cNvGrpSpPr/>
-        <p:nvPr/>
-      </p:nvGrpSpPr>
-      <p:grpSpPr>
-        <a:xfrm>
-          <a:off x="0" y="0"/>
-          <a:ext cx="0" cy="0"/>
-          <a:chOff x="0" y="0"/>
-          <a:chExt cx="0" cy="0"/>
-        </a:xfrm>
-      </p:grpSpPr>
-      <p:sp>
-        <p:nvSpPr>
-          <p:cNvPr id="2" name="Title 1"/>
-          <p:cNvSpPr>
-            <a:spLocks noGrp="1"/>
-          </p:cNvSpPr>
-          <p:nvPr>
-            <p:ph type="title"/>
-          </p:nvPr>
-        </p:nvSpPr>
-        <p:spPr/>
-        <p:txBody>
-          <a:bodyPr/>
-          <a:lstStyle/>
-          <a:p>
-            <a:r>
-              <a:rPr lang="es-ES_tradnl" dirty="0" smtClean="0"/>
-              <a:t>Metodología orientada a </a:t>
-            </a:r>
-            <a:r>
-              <a:rPr lang="es-ES_tradnl" dirty="0" err="1" smtClean="0"/>
-              <a:t>testing</a:t>
-            </a:r>
-            <a:endParaRPr lang="es-ES_tradnl" dirty="0"/>
-          </a:p>
-        </p:txBody>
-      </p:sp>
-      <p:sp>
-        <p:nvSpPr>
-          <p:cNvPr id="4" name="Slide Number Placeholder 3"/>
-          <p:cNvSpPr>
-            <a:spLocks noGrp="1"/>
-          </p:cNvSpPr>
-          <p:nvPr>
-            <p:ph type="sldNum" sz="quarter" idx="12"/>
-          </p:nvPr>
-        </p:nvSpPr>
-        <p:spPr/>
-        <p:txBody>
-          <a:bodyPr>
-            <a:normAutofit lnSpcReduction="10000"/>
-          </a:bodyPr>
-          <a:lstStyle/>
-          <a:p>
-            <a:fld id="{66B77C49-310C-4D67-A641-7D2CCF3E3B8A}" type="slidenum">
               <a:rPr lang="es-ES_tradnl" smtClean="0"/>
-              <a:t>19</a:t>
+              <a:t>20</a:t>
             </a:fld>
             <a:endParaRPr lang="es-ES_tradnl" dirty="0"/>
           </a:p>
@@ -12390,7 +12178,7 @@
 </p:sld>
 </file>
 
-<file path=ppt/slides/slide21.xml><?xml version="1.0" encoding="utf-8"?>
+<file path=ppt/slides/slide22.xml><?xml version="1.0" encoding="utf-8"?>
 <p:sld xmlns:a="http://schemas.openxmlformats.org/drawingml/2006/main" xmlns:r="http://schemas.openxmlformats.org/officeDocument/2006/relationships" xmlns:p="http://schemas.openxmlformats.org/presentationml/2006/main">
   <p:cSld>
     <p:spTree>
@@ -12469,7 +12257,7 @@
           <a:p>
             <a:fld id="{66B77C49-310C-4D67-A641-7D2CCF3E3B8A}" type="slidenum">
               <a:rPr lang="es-CL" smtClean="0"/>
-              <a:t>20</a:t>
+              <a:t>21</a:t>
             </a:fld>
             <a:endParaRPr lang="es-CL"/>
           </a:p>

</xml_diff>

<commit_message>
Fix a imagen de oracle
</commit_message>
<xml_diff>
--- a/presentación segunda iteración.pptx
+++ b/presentación segunda iteración.pptx
@@ -1190,6 +1190,429 @@
       <dsp:cNvGrpSpPr/>
     </dsp:nvGrpSpPr>
     <dsp:grpSpPr/>
+    <dsp:sp modelId="{C76C1348-8C62-49B3-ABA8-46DE86A2A3CA}">
+      <dsp:nvSpPr>
+        <dsp:cNvPr id="0" name=""/>
+        <dsp:cNvSpPr/>
+      </dsp:nvSpPr>
+      <dsp:spPr>
+        <a:xfrm>
+          <a:off x="2534384" y="421329"/>
+          <a:ext cx="2130147" cy="2130147"/>
+        </a:xfrm>
+        <a:prstGeom prst="ellipse">
+          <a:avLst/>
+        </a:prstGeom>
+        <a:solidFill>
+          <a:srgbClr val="FF0000"/>
+        </a:solidFill>
+        <a:ln w="13970" cap="flat" cmpd="sng" algn="ctr">
+          <a:solidFill>
+            <a:schemeClr val="lt1">
+              <a:hueOff val="0"/>
+              <a:satOff val="0"/>
+              <a:lumOff val="0"/>
+              <a:alphaOff val="0"/>
+            </a:schemeClr>
+          </a:solidFill>
+          <a:prstDash val="solid"/>
+        </a:ln>
+        <a:effectLst/>
+      </dsp:spPr>
+      <dsp:style>
+        <a:lnRef idx="2">
+          <a:scrgbClr r="0" g="0" b="0"/>
+        </a:lnRef>
+        <a:fillRef idx="1">
+          <a:scrgbClr r="0" g="0" b="0"/>
+        </a:fillRef>
+        <a:effectRef idx="0">
+          <a:scrgbClr r="0" g="0" b="0"/>
+        </a:effectRef>
+        <a:fontRef idx="minor">
+          <a:schemeClr val="lt1"/>
+        </a:fontRef>
+      </dsp:style>
+      <dsp:txBody>
+        <a:bodyPr spcFirstLastPara="0" vert="horz" wrap="square" lIns="25400" tIns="25400" rIns="25400" bIns="25400" numCol="1" spcCol="1270" anchor="ctr" anchorCtr="0">
+          <a:noAutofit/>
+        </a:bodyPr>
+        <a:lstStyle/>
+        <a:p>
+          <a:pPr lvl="0" algn="ctr" defTabSz="889000">
+            <a:lnSpc>
+              <a:spcPct val="90000"/>
+            </a:lnSpc>
+            <a:spcBef>
+              <a:spcPct val="0"/>
+            </a:spcBef>
+            <a:spcAft>
+              <a:spcPct val="35000"/>
+            </a:spcAft>
+          </a:pPr>
+          <a:r>
+            <a:rPr lang="es-CL" sz="2000" kern="1200" dirty="0" smtClean="0"/>
+            <a:t>Test falla</a:t>
+          </a:r>
+          <a:endParaRPr lang="es-CL" sz="2000" kern="1200" dirty="0"/>
+        </a:p>
+      </dsp:txBody>
+      <dsp:txXfrm>
+        <a:off x="2846337" y="733282"/>
+        <a:ext cx="1506241" cy="1506241"/>
+      </dsp:txXfrm>
+    </dsp:sp>
+    <dsp:sp modelId="{C2AAD9A6-BC90-4D96-8982-800C7083F0C6}">
+      <dsp:nvSpPr>
+        <dsp:cNvPr id="0" name=""/>
+        <dsp:cNvSpPr/>
+      </dsp:nvSpPr>
+      <dsp:spPr>
+        <a:xfrm rot="3002127">
+          <a:off x="4327117" y="2291216"/>
+          <a:ext cx="496114" cy="718924"/>
+        </a:xfrm>
+        <a:prstGeom prst="rightArrow">
+          <a:avLst>
+            <a:gd name="adj1" fmla="val 60000"/>
+            <a:gd name="adj2" fmla="val 50000"/>
+          </a:avLst>
+        </a:prstGeom>
+        <a:solidFill>
+          <a:schemeClr val="accent1">
+            <a:tint val="60000"/>
+            <a:hueOff val="0"/>
+            <a:satOff val="0"/>
+            <a:lumOff val="0"/>
+            <a:alphaOff val="0"/>
+          </a:schemeClr>
+        </a:solidFill>
+        <a:ln>
+          <a:noFill/>
+        </a:ln>
+        <a:effectLst/>
+      </dsp:spPr>
+      <dsp:style>
+        <a:lnRef idx="0">
+          <a:scrgbClr r="0" g="0" b="0"/>
+        </a:lnRef>
+        <a:fillRef idx="1">
+          <a:scrgbClr r="0" g="0" b="0"/>
+        </a:fillRef>
+        <a:effectRef idx="0">
+          <a:scrgbClr r="0" g="0" b="0"/>
+        </a:effectRef>
+        <a:fontRef idx="minor">
+          <a:schemeClr val="lt1"/>
+        </a:fontRef>
+      </dsp:style>
+      <dsp:txBody>
+        <a:bodyPr spcFirstLastPara="0" vert="horz" wrap="square" lIns="0" tIns="0" rIns="0" bIns="0" numCol="1" spcCol="1270" anchor="ctr" anchorCtr="0">
+          <a:noAutofit/>
+        </a:bodyPr>
+        <a:lstStyle/>
+        <a:p>
+          <a:pPr lvl="0" algn="ctr" defTabSz="1377950">
+            <a:lnSpc>
+              <a:spcPct val="90000"/>
+            </a:lnSpc>
+            <a:spcBef>
+              <a:spcPct val="0"/>
+            </a:spcBef>
+            <a:spcAft>
+              <a:spcPct val="35000"/>
+            </a:spcAft>
+          </a:pPr>
+          <a:endParaRPr lang="es-CL" sz="3100" kern="1200"/>
+        </a:p>
+      </dsp:txBody>
+      <dsp:txXfrm>
+        <a:off x="4353735" y="2377965"/>
+        <a:ext cx="347280" cy="431354"/>
+      </dsp:txXfrm>
+    </dsp:sp>
+    <dsp:sp modelId="{06F5E886-E7D3-456B-8D24-E4CA36151A7B}">
+      <dsp:nvSpPr>
+        <dsp:cNvPr id="0" name=""/>
+        <dsp:cNvSpPr/>
+      </dsp:nvSpPr>
+      <dsp:spPr>
+        <a:xfrm>
+          <a:off x="4503854" y="2771404"/>
+          <a:ext cx="2130147" cy="2130147"/>
+        </a:xfrm>
+        <a:prstGeom prst="ellipse">
+          <a:avLst/>
+        </a:prstGeom>
+        <a:solidFill>
+          <a:srgbClr val="00B050"/>
+        </a:solidFill>
+        <a:ln w="13970" cap="flat" cmpd="sng" algn="ctr">
+          <a:solidFill>
+            <a:schemeClr val="lt1">
+              <a:hueOff val="0"/>
+              <a:satOff val="0"/>
+              <a:lumOff val="0"/>
+              <a:alphaOff val="0"/>
+            </a:schemeClr>
+          </a:solidFill>
+          <a:prstDash val="solid"/>
+        </a:ln>
+        <a:effectLst/>
+      </dsp:spPr>
+      <dsp:style>
+        <a:lnRef idx="2">
+          <a:scrgbClr r="0" g="0" b="0"/>
+        </a:lnRef>
+        <a:fillRef idx="1">
+          <a:scrgbClr r="0" g="0" b="0"/>
+        </a:fillRef>
+        <a:effectRef idx="0">
+          <a:scrgbClr r="0" g="0" b="0"/>
+        </a:effectRef>
+        <a:fontRef idx="minor">
+          <a:schemeClr val="lt1"/>
+        </a:fontRef>
+      </dsp:style>
+      <dsp:txBody>
+        <a:bodyPr spcFirstLastPara="0" vert="horz" wrap="square" lIns="25400" tIns="25400" rIns="25400" bIns="25400" numCol="1" spcCol="1270" anchor="ctr" anchorCtr="0">
+          <a:noAutofit/>
+        </a:bodyPr>
+        <a:lstStyle/>
+        <a:p>
+          <a:pPr lvl="0" algn="ctr" defTabSz="889000">
+            <a:lnSpc>
+              <a:spcPct val="90000"/>
+            </a:lnSpc>
+            <a:spcBef>
+              <a:spcPct val="0"/>
+            </a:spcBef>
+            <a:spcAft>
+              <a:spcPct val="35000"/>
+            </a:spcAft>
+          </a:pPr>
+          <a:r>
+            <a:rPr lang="es-CL" sz="2000" kern="1200" dirty="0" smtClean="0"/>
+            <a:t>Test funciona</a:t>
+          </a:r>
+          <a:endParaRPr lang="es-CL" sz="2000" kern="1200" dirty="0"/>
+        </a:p>
+      </dsp:txBody>
+      <dsp:txXfrm>
+        <a:off x="4815807" y="3083357"/>
+        <a:ext cx="1506241" cy="1506241"/>
+      </dsp:txXfrm>
+    </dsp:sp>
+    <dsp:sp modelId="{8CB5DCE5-D772-494C-8EF7-F1A91BF218AB}">
+      <dsp:nvSpPr>
+        <dsp:cNvPr id="0" name=""/>
+        <dsp:cNvSpPr/>
+      </dsp:nvSpPr>
+      <dsp:spPr>
+        <a:xfrm rot="10800007">
+          <a:off x="3077778" y="3477011"/>
+          <a:ext cx="1007760" cy="718924"/>
+        </a:xfrm>
+        <a:prstGeom prst="rightArrow">
+          <a:avLst>
+            <a:gd name="adj1" fmla="val 60000"/>
+            <a:gd name="adj2" fmla="val 50000"/>
+          </a:avLst>
+        </a:prstGeom>
+        <a:solidFill>
+          <a:schemeClr val="accent1">
+            <a:tint val="60000"/>
+            <a:hueOff val="0"/>
+            <a:satOff val="0"/>
+            <a:lumOff val="0"/>
+            <a:alphaOff val="0"/>
+          </a:schemeClr>
+        </a:solidFill>
+        <a:ln>
+          <a:noFill/>
+        </a:ln>
+        <a:effectLst/>
+      </dsp:spPr>
+      <dsp:style>
+        <a:lnRef idx="0">
+          <a:scrgbClr r="0" g="0" b="0"/>
+        </a:lnRef>
+        <a:fillRef idx="1">
+          <a:scrgbClr r="0" g="0" b="0"/>
+        </a:fillRef>
+        <a:effectRef idx="0">
+          <a:scrgbClr r="0" g="0" b="0"/>
+        </a:effectRef>
+        <a:fontRef idx="minor">
+          <a:schemeClr val="lt1"/>
+        </a:fontRef>
+      </dsp:style>
+      <dsp:txBody>
+        <a:bodyPr spcFirstLastPara="0" vert="horz" wrap="square" lIns="0" tIns="0" rIns="0" bIns="0" numCol="1" spcCol="1270" anchor="ctr" anchorCtr="0">
+          <a:noAutofit/>
+        </a:bodyPr>
+        <a:lstStyle/>
+        <a:p>
+          <a:pPr lvl="0" algn="ctr" defTabSz="1377950">
+            <a:lnSpc>
+              <a:spcPct val="90000"/>
+            </a:lnSpc>
+            <a:spcBef>
+              <a:spcPct val="0"/>
+            </a:spcBef>
+            <a:spcAft>
+              <a:spcPct val="35000"/>
+            </a:spcAft>
+          </a:pPr>
+          <a:endParaRPr lang="es-CL" sz="3100" kern="1200"/>
+        </a:p>
+      </dsp:txBody>
+      <dsp:txXfrm rot="10800000">
+        <a:off x="3293455" y="3620796"/>
+        <a:ext cx="792083" cy="431354"/>
+      </dsp:txXfrm>
+    </dsp:sp>
+    <dsp:sp modelId="{C7176718-3917-479F-9504-34D548C915B5}">
+      <dsp:nvSpPr>
+        <dsp:cNvPr id="0" name=""/>
+        <dsp:cNvSpPr/>
+      </dsp:nvSpPr>
+      <dsp:spPr>
+        <a:xfrm>
+          <a:off x="472272" y="2771395"/>
+          <a:ext cx="2130147" cy="2130147"/>
+        </a:xfrm>
+        <a:prstGeom prst="ellipse">
+          <a:avLst/>
+        </a:prstGeom>
+        <a:solidFill>
+          <a:srgbClr val="7030A0"/>
+        </a:solidFill>
+        <a:ln w="13970" cap="flat" cmpd="sng" algn="ctr">
+          <a:solidFill>
+            <a:schemeClr val="lt1">
+              <a:hueOff val="0"/>
+              <a:satOff val="0"/>
+              <a:lumOff val="0"/>
+              <a:alphaOff val="0"/>
+            </a:schemeClr>
+          </a:solidFill>
+          <a:prstDash val="solid"/>
+        </a:ln>
+        <a:effectLst/>
+      </dsp:spPr>
+      <dsp:style>
+        <a:lnRef idx="2">
+          <a:scrgbClr r="0" g="0" b="0"/>
+        </a:lnRef>
+        <a:fillRef idx="1">
+          <a:scrgbClr r="0" g="0" b="0"/>
+        </a:fillRef>
+        <a:effectRef idx="0">
+          <a:scrgbClr r="0" g="0" b="0"/>
+        </a:effectRef>
+        <a:fontRef idx="minor">
+          <a:schemeClr val="lt1"/>
+        </a:fontRef>
+      </dsp:style>
+      <dsp:txBody>
+        <a:bodyPr spcFirstLastPara="0" vert="horz" wrap="square" lIns="25400" tIns="25400" rIns="25400" bIns="25400" numCol="1" spcCol="1270" anchor="ctr" anchorCtr="0">
+          <a:noAutofit/>
+        </a:bodyPr>
+        <a:lstStyle/>
+        <a:p>
+          <a:pPr lvl="0" algn="ctr" defTabSz="889000">
+            <a:lnSpc>
+              <a:spcPct val="90000"/>
+            </a:lnSpc>
+            <a:spcBef>
+              <a:spcPct val="0"/>
+            </a:spcBef>
+            <a:spcAft>
+              <a:spcPct val="35000"/>
+            </a:spcAft>
+          </a:pPr>
+          <a:r>
+            <a:rPr lang="es-CL" sz="2000" kern="1200" dirty="0" smtClean="0"/>
+            <a:t>Refactorizar</a:t>
+          </a:r>
+          <a:endParaRPr lang="es-CL" sz="2000" kern="1200" dirty="0"/>
+        </a:p>
+      </dsp:txBody>
+      <dsp:txXfrm>
+        <a:off x="784225" y="3083348"/>
+        <a:ext cx="1506241" cy="1506241"/>
+      </dsp:txXfrm>
+    </dsp:sp>
+    <dsp:sp modelId="{37311926-2A8B-4C4C-A44C-204F5F0FD710}">
+      <dsp:nvSpPr>
+        <dsp:cNvPr id="0" name=""/>
+        <dsp:cNvSpPr/>
+      </dsp:nvSpPr>
+      <dsp:spPr>
+        <a:xfrm rot="18675958">
+          <a:off x="2294506" y="2313208"/>
+          <a:ext cx="528076" cy="718924"/>
+        </a:xfrm>
+        <a:prstGeom prst="rightArrow">
+          <a:avLst>
+            <a:gd name="adj1" fmla="val 60000"/>
+            <a:gd name="adj2" fmla="val 50000"/>
+          </a:avLst>
+        </a:prstGeom>
+        <a:solidFill>
+          <a:schemeClr val="accent1">
+            <a:tint val="60000"/>
+            <a:hueOff val="0"/>
+            <a:satOff val="0"/>
+            <a:lumOff val="0"/>
+            <a:alphaOff val="0"/>
+          </a:schemeClr>
+        </a:solidFill>
+        <a:ln>
+          <a:noFill/>
+        </a:ln>
+        <a:effectLst/>
+      </dsp:spPr>
+      <dsp:style>
+        <a:lnRef idx="0">
+          <a:scrgbClr r="0" g="0" b="0"/>
+        </a:lnRef>
+        <a:fillRef idx="1">
+          <a:scrgbClr r="0" g="0" b="0"/>
+        </a:fillRef>
+        <a:effectRef idx="0">
+          <a:scrgbClr r="0" g="0" b="0"/>
+        </a:effectRef>
+        <a:fontRef idx="minor">
+          <a:schemeClr val="lt1"/>
+        </a:fontRef>
+      </dsp:style>
+      <dsp:txBody>
+        <a:bodyPr spcFirstLastPara="0" vert="horz" wrap="square" lIns="0" tIns="0" rIns="0" bIns="0" numCol="1" spcCol="1270" anchor="ctr" anchorCtr="0">
+          <a:noAutofit/>
+        </a:bodyPr>
+        <a:lstStyle/>
+        <a:p>
+          <a:pPr lvl="0" algn="ctr" defTabSz="1377950">
+            <a:lnSpc>
+              <a:spcPct val="90000"/>
+            </a:lnSpc>
+            <a:spcBef>
+              <a:spcPct val="0"/>
+            </a:spcBef>
+            <a:spcAft>
+              <a:spcPct val="35000"/>
+            </a:spcAft>
+          </a:pPr>
+          <a:endParaRPr lang="es-CL" sz="3100" kern="1200"/>
+        </a:p>
+      </dsp:txBody>
+      <dsp:txXfrm>
+        <a:off x="2321473" y="2516533"/>
+        <a:ext cx="369653" cy="431354"/>
+      </dsp:txXfrm>
+    </dsp:sp>
   </dsp:spTree>
 </dsp:drawing>
 </file>
@@ -4028,11 +4451,7 @@
             </a:pPr>
             <a:r>
               <a:rPr lang="es-CL" dirty="0" smtClean="0"/>
-              <a:t>UI</a:t>
-            </a:r>
-            <a:r>
-              <a:rPr lang="es-CL" dirty="0" smtClean="0"/>
-              <a:t>: </a:t>
+              <a:t>UI: </a:t>
             </a:r>
             <a:r>
               <a:rPr lang="es-CL" dirty="0" err="1" smtClean="0"/>
@@ -4040,15 +4459,7 @@
             </a:r>
             <a:r>
               <a:rPr lang="es-CL" dirty="0" smtClean="0"/>
-              <a:t> </a:t>
-            </a:r>
-            <a:r>
-              <a:rPr lang="es-CL" dirty="0" smtClean="0"/>
-              <a:t>Interface: no implementado. Contiene la lógica de la interfaz de usuario y las validaciones del lado del cliente</a:t>
-            </a:r>
-            <a:r>
-              <a:rPr lang="es-CL" dirty="0" smtClean="0"/>
-              <a:t>.</a:t>
+              <a:t> Interface: no implementado. Contiene la lógica de la interfaz de usuario y las validaciones del lado del cliente.</a:t>
             </a:r>
           </a:p>
           <a:p>
@@ -4064,7 +4475,6 @@
               <a:rPr lang="es-CL" dirty="0" smtClean="0"/>
               <a:t>: Pruebas de la capa de negocio</a:t>
             </a:r>
-            <a:endParaRPr lang="es-CL" dirty="0" smtClean="0"/>
           </a:p>
           <a:p>
             <a:endParaRPr lang="es-CL" dirty="0"/>
@@ -10724,32 +11134,15 @@
       </p:pic>
       <p:pic>
         <p:nvPicPr>
-          <p:cNvPr id="13" name="Imagen 12"/>
+          <p:cNvPr id="14" name="Imagen 13"/>
           <p:cNvPicPr>
             <a:picLocks noChangeAspect="1"/>
           </p:cNvPicPr>
           <p:nvPr/>
         </p:nvPicPr>
         <p:blipFill rotWithShape="1">
-          <a:blip r:embed="rId8" cstate="print">
+          <a:blip r:embed="rId7" cstate="print">
             <a:extLst>
-              <a:ext uri="{BEBA8EAE-BF5A-486C-A8C5-ECC9F3942E4B}">
-                <a14:imgProps xmlns:a14="http://schemas.microsoft.com/office/drawing/2010/main">
-                  <a14:imgLayer r:embed="rId9">
-                    <a14:imgEffect>
-                      <a14:backgroundRemoval t="10000" b="90000" l="5217" r="97826">
-                        <a14:foregroundMark x1="42174" y1="42174" x2="42174" y2="42174"/>
-                        <a14:foregroundMark x1="54058" y1="56957" x2="54058" y2="56957"/>
-                        <a14:foregroundMark x1="69130" y1="53043" x2="69130" y2="53043"/>
-                        <a14:foregroundMark x1="80870" y1="46087" x2="80870" y2="46087"/>
-                        <a14:foregroundMark x1="19420" y1="51739" x2="19420" y2="51739"/>
-                        <a14:foregroundMark x1="5362" y1="65217" x2="5362" y2="65217"/>
-                        <a14:foregroundMark x1="97826" y1="36522" x2="97826" y2="36522"/>
-                      </a14:backgroundRemoval>
-                    </a14:imgEffect>
-                  </a14:imgLayer>
-                </a14:imgProps>
-              </a:ext>
               <a:ext uri="{28A0092B-C50C-407E-A947-70E740481C1C}">
                 <a14:useLocalDpi xmlns:a14="http://schemas.microsoft.com/office/drawing/2010/main" val="0"/>
               </a:ext>
@@ -11284,11 +11677,7 @@
             <a:pPr algn="ctr"/>
             <a:r>
               <a:rPr lang="es-ES_tradnl" dirty="0" smtClean="0"/>
-              <a:t>Fig. </a:t>
-            </a:r>
-            <a:r>
-              <a:rPr lang="es-ES_tradnl" dirty="0" smtClean="0"/>
-              <a:t>9: Diccionario de datos de tabla Paciente</a:t>
+              <a:t>Fig. 9: Diccionario de datos de tabla Paciente</a:t>
             </a:r>
             <a:endParaRPr lang="es-ES_tradnl" dirty="0"/>
           </a:p>
@@ -11356,7 +11745,7 @@
         <p:spPr>
           <a:xfrm>
             <a:off x="2479494" y="1775946"/>
-            <a:ext cx="6543675" cy="4257675"/>
+            <a:ext cx="6545973" cy="4257675"/>
           </a:xfrm>
           <a:prstGeom prst="rect">
             <a:avLst/>

</xml_diff>